<commit_message>
changed pictures description and added something to the presentation
</commit_message>
<xml_diff>
--- a/Presentation/Thesis_Luca_brodo.pptx
+++ b/Presentation/Thesis_Luca_brodo.pptx
@@ -204,7 +204,7 @@
           <a:p>
             <a:fld id="{4214EAB5-E09C-2143-976E-A916457BEE18}" type="datetimeFigureOut">
               <a:rPr lang="en-US" smtClean="0"/>
-              <a:t>2/1/22</a:t>
+              <a:t>2/3/22</a:t>
             </a:fld>
             <a:endParaRPr lang="en-US" dirty="0"/>
           </a:p>
@@ -825,7 +825,7 @@
           <a:p>
             <a:fld id="{5CB56AE8-42AF-F441-9809-A79E00C02F96}" type="datetime1">
               <a:rPr lang="it-IT" smtClean="0"/>
-              <a:t>01/02/22</a:t>
+              <a:t>03/02/22</a:t>
             </a:fld>
             <a:r>
               <a:rPr lang="en-US" dirty="0"/>
@@ -1028,7 +1028,7 @@
           <a:p>
             <a:fld id="{C8A0F904-3984-F74D-8024-6548AF73ECB7}" type="datetime1">
               <a:rPr lang="it-IT" smtClean="0"/>
-              <a:t>01/02/22</a:t>
+              <a:t>03/02/22</a:t>
             </a:fld>
             <a:endParaRPr lang="en-US" dirty="0"/>
           </a:p>
@@ -1262,7 +1262,7 @@
           <a:p>
             <a:fld id="{06B2E407-A84A-E044-9FF8-31AD125FD6AD}" type="datetime1">
               <a:rPr lang="it-IT" smtClean="0"/>
-              <a:t>01/02/22</a:t>
+              <a:t>03/02/22</a:t>
             </a:fld>
             <a:endParaRPr lang="en-US" dirty="0"/>
           </a:p>
@@ -1598,7 +1598,7 @@
           <a:p>
             <a:fld id="{5CB56AE8-42AF-F441-9809-A79E00C02F96}" type="datetime1">
               <a:rPr lang="it-IT" smtClean="0"/>
-              <a:t>01/02/22</a:t>
+              <a:t>03/02/22</a:t>
             </a:fld>
             <a:r>
               <a:rPr lang="en-US" dirty="0"/>
@@ -1877,7 +1877,7 @@
           <a:p>
             <a:fld id="{0CCEF389-FED6-0141-95DF-03E8D246A958}" type="datetime1">
               <a:rPr lang="it-IT" smtClean="0"/>
-              <a:t>01/02/22</a:t>
+              <a:t>03/02/22</a:t>
             </a:fld>
             <a:endParaRPr lang="en-US" dirty="0"/>
           </a:p>
@@ -2169,7 +2169,7 @@
           <a:p>
             <a:fld id="{784526C7-5665-3F44-99CB-8F13CE91A9A0}" type="datetime1">
               <a:rPr lang="it-IT" smtClean="0"/>
-              <a:t>01/02/22</a:t>
+              <a:t>03/02/22</a:t>
             </a:fld>
             <a:endParaRPr lang="en-US" dirty="0"/>
           </a:p>
@@ -2608,7 +2608,7 @@
           <a:p>
             <a:fld id="{843EB9BF-A83E-1649-BEB9-D8B13BCD5B40}" type="datetime1">
               <a:rPr lang="it-IT" smtClean="0"/>
-              <a:t>01/02/22</a:t>
+              <a:t>03/02/22</a:t>
             </a:fld>
             <a:endParaRPr lang="en-US" dirty="0"/>
           </a:p>
@@ -2774,7 +2774,7 @@
           <a:p>
             <a:fld id="{5BB4D067-D34C-D64F-8EA9-4FEB01054DF0}" type="datetime1">
               <a:rPr lang="it-IT" smtClean="0"/>
-              <a:t>01/02/22</a:t>
+              <a:t>03/02/22</a:t>
             </a:fld>
             <a:endParaRPr lang="en-US" dirty="0"/>
           </a:p>
@@ -2911,7 +2911,7 @@
           <a:p>
             <a:fld id="{11DC82E9-AA14-E247-B806-15BA2FEA4AA5}" type="datetime1">
               <a:rPr lang="it-IT" smtClean="0"/>
-              <a:t>01/02/22</a:t>
+              <a:t>03/02/22</a:t>
             </a:fld>
             <a:endParaRPr lang="en-US" dirty="0"/>
           </a:p>
@@ -3248,7 +3248,7 @@
           <a:p>
             <a:fld id="{B986F908-8F0F-4F41-9FD6-7C383D15ABDF}" type="datetime1">
               <a:rPr lang="it-IT" smtClean="0"/>
-              <a:t>01/02/22</a:t>
+              <a:t>03/02/22</a:t>
             </a:fld>
             <a:endParaRPr lang="en-US" dirty="0"/>
           </a:p>
@@ -3561,7 +3561,7 @@
           <a:p>
             <a:fld id="{1C531A52-3DB3-9943-93E5-963C2129EF0B}" type="datetime1">
               <a:rPr lang="it-IT" smtClean="0"/>
-              <a:t>01/02/22</a:t>
+              <a:t>03/02/22</a:t>
             </a:fld>
             <a:endParaRPr lang="en-US" dirty="0"/>
           </a:p>
@@ -3922,7 +3922,7 @@
           <a:p>
             <a:fld id="{5CB56AE8-42AF-F441-9809-A79E00C02F96}" type="datetime1">
               <a:rPr lang="it-IT" smtClean="0"/>
-              <a:t>01/02/22</a:t>
+              <a:t>03/02/22</a:t>
             </a:fld>
             <a:r>
               <a:rPr lang="en-US" dirty="0"/>
@@ -4391,7 +4391,7 @@
           <a:p>
             <a:fld id="{219B1543-EBD0-3E4F-A4BD-EC2EF08A9178}" type="datetime1">
               <a:rPr lang="it-IT" smtClean="0"/>
-              <a:t>01/02/22</a:t>
+              <a:t>03/02/22</a:t>
             </a:fld>
             <a:r>
               <a:rPr lang="en-US" dirty="0"/>
@@ -4510,7 +4510,7 @@
           <a:p>
             <a:fld id="{5CB56AE8-42AF-F441-9809-A79E00C02F96}" type="datetime1">
               <a:rPr lang="it-IT" smtClean="0"/>
-              <a:t>01/02/22</a:t>
+              <a:t>03/02/22</a:t>
             </a:fld>
             <a:r>
               <a:rPr lang="en-US" dirty="0"/>
@@ -4696,7 +4696,7 @@
           <a:p>
             <a:fld id="{5CB56AE8-42AF-F441-9809-A79E00C02F96}" type="datetime1">
               <a:rPr lang="it-IT" smtClean="0"/>
-              <a:t>01/02/22</a:t>
+              <a:t>03/02/22</a:t>
             </a:fld>
             <a:r>
               <a:rPr lang="en-US" dirty="0"/>
@@ -4758,7 +4758,9 @@
           </a:xfrm>
         </p:spPr>
         <p:txBody>
-          <a:bodyPr/>
+          <a:bodyPr>
+            <a:normAutofit/>
+          </a:bodyPr>
           <a:lstStyle/>
           <a:p>
             <a:r>
@@ -4769,13 +4771,33 @@
           <a:p>
             <a:r>
               <a:rPr lang="en-GB" dirty="0"/>
-              <a:t>Inference time is related to accuracy and/or training time</a:t>
+              <a:t>Inference time is related to training time</a:t>
             </a:r>
           </a:p>
           <a:p>
             <a:r>
               <a:rPr lang="en-GB" dirty="0"/>
-              <a:t>The dimensions of the pictures influence inference time</a:t>
+              <a:t>We can relate accuracy to inference time</a:t>
+            </a:r>
+          </a:p>
+          <a:p>
+            <a:r>
+              <a:rPr lang="en-GB" dirty="0"/>
+              <a:t>The attributes of the pictures influence inference time</a:t>
+            </a:r>
+          </a:p>
+          <a:p>
+            <a:pPr lvl="1"/>
+            <a:r>
+              <a:rPr lang="en-GB" dirty="0"/>
+              <a:t>Resolution</a:t>
+            </a:r>
+          </a:p>
+          <a:p>
+            <a:pPr lvl="1"/>
+            <a:r>
+              <a:rPr lang="en-GB" dirty="0"/>
+              <a:t>Dimensions </a:t>
             </a:r>
           </a:p>
           <a:p>
@@ -4788,12 +4810,6 @@
             <a:r>
               <a:rPr lang="en-GB" dirty="0"/>
               <a:t>Higher accuracy in training relates to higher inference accuracy</a:t>
-            </a:r>
-          </a:p>
-          <a:p>
-            <a:r>
-              <a:rPr lang="en-GB" dirty="0"/>
-              <a:t>We can relate accuracy to inference time</a:t>
             </a:r>
           </a:p>
           <a:p>
@@ -4970,7 +4986,7 @@
           <a:p>
             <a:fld id="{5CB56AE8-42AF-F441-9809-A79E00C02F96}" type="datetime1">
               <a:rPr lang="it-IT" smtClean="0"/>
-              <a:t>01/02/22</a:t>
+              <a:t>03/02/22</a:t>
             </a:fld>
             <a:r>
               <a:rPr lang="en-US"/>
@@ -5124,7 +5140,7 @@
           <a:p>
             <a:fld id="{5CB56AE8-42AF-F441-9809-A79E00C02F96}" type="datetime1">
               <a:rPr lang="it-IT" smtClean="0"/>
-              <a:t>01/02/22</a:t>
+              <a:t>03/02/22</a:t>
             </a:fld>
             <a:r>
               <a:rPr lang="en-US" dirty="0"/>

</xml_diff>